<commit_message>
Changed ios and started the coherence based on iOS version
</commit_message>
<xml_diff>
--- a/Documentation Plan.pptx
+++ b/Documentation Plan.pptx
@@ -236,7 +236,7 @@
           <a:p>
             <a:fld id="{017DD847-B72F-1645-9236-9E6D0E58213E}" type="datetimeFigureOut">
               <a:rPr lang="en-US" smtClean="0"/>
-              <a:t>5/30/18</a:t>
+              <a:t>7/3/18</a:t>
             </a:fld>
             <a:endParaRPr lang="en-US"/>
           </a:p>
@@ -413,7 +413,7 @@
           <a:p>
             <a:fld id="{93E6386D-B582-6E4C-BEC9-59DA0A0EA925}" type="datetimeFigureOut">
               <a:rPr lang="en-US" smtClean="0"/>
-              <a:t>5/30/18</a:t>
+              <a:t>7/3/18</a:t>
             </a:fld>
             <a:endParaRPr lang="en-US"/>
           </a:p>
@@ -1020,7 +1020,7 @@
           <a:p>
             <a:fld id="{CD389961-EEE8-144C-9408-3DF3FBDF4FFD}" type="datetimeFigureOut">
               <a:rPr lang="en-US" smtClean="0"/>
-              <a:t>5/30/18</a:t>
+              <a:t>7/3/18</a:t>
             </a:fld>
             <a:endParaRPr lang="en-US"/>
           </a:p>
@@ -1218,7 +1218,7 @@
           <a:p>
             <a:fld id="{CD389961-EEE8-144C-9408-3DF3FBDF4FFD}" type="datetimeFigureOut">
               <a:rPr lang="en-US" smtClean="0"/>
-              <a:t>5/30/18</a:t>
+              <a:t>7/3/18</a:t>
             </a:fld>
             <a:endParaRPr lang="en-US"/>
           </a:p>
@@ -1426,7 +1426,7 @@
           <a:p>
             <a:fld id="{CD389961-EEE8-144C-9408-3DF3FBDF4FFD}" type="datetimeFigureOut">
               <a:rPr lang="en-US" smtClean="0"/>
-              <a:t>5/30/18</a:t>
+              <a:t>7/3/18</a:t>
             </a:fld>
             <a:endParaRPr lang="en-US"/>
           </a:p>
@@ -2106,7 +2106,7 @@
           <a:p>
             <a:fld id="{CD389961-EEE8-144C-9408-3DF3FBDF4FFD}" type="datetimeFigureOut">
               <a:rPr lang="en-US" smtClean="0"/>
-              <a:t>5/30/18</a:t>
+              <a:t>7/3/18</a:t>
             </a:fld>
             <a:endParaRPr lang="en-US"/>
           </a:p>
@@ -2381,7 +2381,7 @@
           <a:p>
             <a:fld id="{CD389961-EEE8-144C-9408-3DF3FBDF4FFD}" type="datetimeFigureOut">
               <a:rPr lang="en-US" smtClean="0"/>
-              <a:t>5/30/18</a:t>
+              <a:t>7/3/18</a:t>
             </a:fld>
             <a:endParaRPr lang="en-US"/>
           </a:p>
@@ -2646,7 +2646,7 @@
           <a:p>
             <a:fld id="{CD389961-EEE8-144C-9408-3DF3FBDF4FFD}" type="datetimeFigureOut">
               <a:rPr lang="en-US" smtClean="0"/>
-              <a:t>5/30/18</a:t>
+              <a:t>7/3/18</a:t>
             </a:fld>
             <a:endParaRPr lang="en-US"/>
           </a:p>
@@ -3058,7 +3058,7 @@
           <a:p>
             <a:fld id="{CD389961-EEE8-144C-9408-3DF3FBDF4FFD}" type="datetimeFigureOut">
               <a:rPr lang="en-US" smtClean="0"/>
-              <a:t>5/30/18</a:t>
+              <a:t>7/3/18</a:t>
             </a:fld>
             <a:endParaRPr lang="en-US"/>
           </a:p>
@@ -3199,7 +3199,7 @@
           <a:p>
             <a:fld id="{CD389961-EEE8-144C-9408-3DF3FBDF4FFD}" type="datetimeFigureOut">
               <a:rPr lang="en-US" smtClean="0"/>
-              <a:t>5/30/18</a:t>
+              <a:t>7/3/18</a:t>
             </a:fld>
             <a:endParaRPr lang="en-US"/>
           </a:p>
@@ -3312,7 +3312,7 @@
           <a:p>
             <a:fld id="{CD389961-EEE8-144C-9408-3DF3FBDF4FFD}" type="datetimeFigureOut">
               <a:rPr lang="en-US" smtClean="0"/>
-              <a:t>5/30/18</a:t>
+              <a:t>7/3/18</a:t>
             </a:fld>
             <a:endParaRPr lang="en-US"/>
           </a:p>
@@ -3623,7 +3623,7 @@
           <a:p>
             <a:fld id="{CD389961-EEE8-144C-9408-3DF3FBDF4FFD}" type="datetimeFigureOut">
               <a:rPr lang="en-US" smtClean="0"/>
-              <a:t>5/30/18</a:t>
+              <a:t>7/3/18</a:t>
             </a:fld>
             <a:endParaRPr lang="en-US"/>
           </a:p>
@@ -3911,7 +3911,7 @@
           <a:p>
             <a:fld id="{CD389961-EEE8-144C-9408-3DF3FBDF4FFD}" type="datetimeFigureOut">
               <a:rPr lang="en-US" smtClean="0"/>
-              <a:t>5/30/18</a:t>
+              <a:t>7/3/18</a:t>
             </a:fld>
             <a:endParaRPr lang="en-US"/>
           </a:p>
@@ -4152,7 +4152,7 @@
           <a:p>
             <a:fld id="{CD389961-EEE8-144C-9408-3DF3FBDF4FFD}" type="datetimeFigureOut">
               <a:rPr lang="en-US" smtClean="0"/>
-              <a:t>5/30/18</a:t>
+              <a:t>7/3/18</a:t>
             </a:fld>
             <a:endParaRPr lang="en-US"/>
           </a:p>
@@ -10256,21 +10256,7 @@
                 <a:latin typeface="Palanquin" panose="020B0004020203020204" pitchFamily="34" charset="77"/>
                 <a:cs typeface="Palanquin" panose="020B0004020203020204" pitchFamily="34" charset="77"/>
               </a:rPr>
-              <a:t>For iOS/Android/React</a:t>
-            </a:r>
-            <a:r>
-              <a:rPr lang="en-US">
-                <a:latin typeface="Palanquin" panose="020B0004020203020204" pitchFamily="34" charset="77"/>
-                <a:cs typeface="Palanquin" panose="020B0004020203020204" pitchFamily="34" charset="77"/>
-              </a:rPr>
-              <a:t>/Xamarin </a:t>
-            </a:r>
-            <a:r>
-              <a:rPr lang="en-US" dirty="0">
-                <a:latin typeface="Palanquin" panose="020B0004020203020204" pitchFamily="34" charset="77"/>
-                <a:cs typeface="Palanquin" panose="020B0004020203020204" pitchFamily="34" charset="77"/>
-              </a:rPr>
-              <a:t>: Configure </a:t>
+              <a:t>For iOS/Android/React/Xamarin : Configure </a:t>
             </a:r>
             <a:r>
               <a:rPr lang="en-US" dirty="0" err="1">

</xml_diff>